<commit_message>
Updated report, visualization code, and made presentation part 2
</commit_message>
<xml_diff>
--- a/Presentations/For Me/Presentation.pptx
+++ b/Presentations/For Me/Presentation.pptx
@@ -21,6 +21,7 @@
     <p:sldId id="268" r:id="rId15"/>
     <p:sldId id="269" r:id="rId16"/>
     <p:sldId id="274" r:id="rId17"/>
+    <p:sldId id="275" r:id="rId18"/>
   </p:sldIdLst>
   <p:sldSz cx="12192000" cy="6858000"/>
   <p:notesSz cx="6858000" cy="9144000"/>
@@ -127,6 +128,18 @@
 </p:presentation>
 </file>
 
+<file path=ppt/commentAuthors.xml><?xml version="1.0" encoding="utf-8"?>
+<p:cmAuthorLst xmlns:a="http://schemas.openxmlformats.org/drawingml/2006/main" xmlns:r="http://schemas.openxmlformats.org/officeDocument/2006/relationships" xmlns:p="http://schemas.openxmlformats.org/presentationml/2006/main">
+  <p:cmAuthor id="1" name="William Pembleton" initials="WP" lastIdx="1" clrIdx="0">
+    <p:extLst>
+      <p:ext uri="{19B8F6BF-5375-455C-9EA6-DF929625EA0E}">
+        <p15:presenceInfo xmlns:p15="http://schemas.microsoft.com/office/powerpoint/2012/main" userId="aa56e9868da9a350" providerId="Windows Live"/>
+      </p:ext>
+    </p:extLst>
+  </p:cmAuthor>
+</p:cmAuthorLst>
+</file>
+
 <file path=ppt/slideLayouts/slideLayout1.xml><?xml version="1.0" encoding="utf-8"?>
 <p:sldLayout xmlns:a="http://schemas.openxmlformats.org/drawingml/2006/main" xmlns:r="http://schemas.openxmlformats.org/officeDocument/2006/relationships" xmlns:p="http://schemas.openxmlformats.org/presentationml/2006/main" type="title" preserve="1">
   <p:cSld name="Title Slide">
@@ -274,7 +287,7 @@
           <a:p>
             <a:fld id="{FE400534-9B4E-43CC-9E90-F3FF0615A88D}" type="datetimeFigureOut">
               <a:rPr lang="en-US" smtClean="0"/>
-              <a:t>10/30/2018</a:t>
+              <a:t>11/12/2018</a:t>
             </a:fld>
             <a:endParaRPr lang="en-US"/>
           </a:p>
@@ -477,7 +490,7 @@
           <a:p>
             <a:fld id="{FE400534-9B4E-43CC-9E90-F3FF0615A88D}" type="datetimeFigureOut">
               <a:rPr lang="en-US" smtClean="0"/>
-              <a:t>10/30/2018</a:t>
+              <a:t>11/12/2018</a:t>
             </a:fld>
             <a:endParaRPr lang="en-US"/>
           </a:p>
@@ -685,7 +698,7 @@
           <a:p>
             <a:fld id="{FE400534-9B4E-43CC-9E90-F3FF0615A88D}" type="datetimeFigureOut">
               <a:rPr lang="en-US" smtClean="0"/>
-              <a:t>10/30/2018</a:t>
+              <a:t>11/12/2018</a:t>
             </a:fld>
             <a:endParaRPr lang="en-US"/>
           </a:p>
@@ -883,7 +896,7 @@
           <a:p>
             <a:fld id="{FE400534-9B4E-43CC-9E90-F3FF0615A88D}" type="datetimeFigureOut">
               <a:rPr lang="en-US" smtClean="0"/>
-              <a:t>10/30/2018</a:t>
+              <a:t>11/12/2018</a:t>
             </a:fld>
             <a:endParaRPr lang="en-US"/>
           </a:p>
@@ -1158,7 +1171,7 @@
           <a:p>
             <a:fld id="{FE400534-9B4E-43CC-9E90-F3FF0615A88D}" type="datetimeFigureOut">
               <a:rPr lang="en-US" smtClean="0"/>
-              <a:t>10/30/2018</a:t>
+              <a:t>11/12/2018</a:t>
             </a:fld>
             <a:endParaRPr lang="en-US"/>
           </a:p>
@@ -1428,7 +1441,7 @@
           <a:p>
             <a:fld id="{FE400534-9B4E-43CC-9E90-F3FF0615A88D}" type="datetimeFigureOut">
               <a:rPr lang="en-US" smtClean="0"/>
-              <a:t>10/30/2018</a:t>
+              <a:t>11/12/2018</a:t>
             </a:fld>
             <a:endParaRPr lang="en-US"/>
           </a:p>
@@ -1840,7 +1853,7 @@
           <a:p>
             <a:fld id="{FE400534-9B4E-43CC-9E90-F3FF0615A88D}" type="datetimeFigureOut">
               <a:rPr lang="en-US" smtClean="0"/>
-              <a:t>10/30/2018</a:t>
+              <a:t>11/12/2018</a:t>
             </a:fld>
             <a:endParaRPr lang="en-US"/>
           </a:p>
@@ -1981,7 +1994,7 @@
           <a:p>
             <a:fld id="{FE400534-9B4E-43CC-9E90-F3FF0615A88D}" type="datetimeFigureOut">
               <a:rPr lang="en-US" smtClean="0"/>
-              <a:t>10/30/2018</a:t>
+              <a:t>11/12/2018</a:t>
             </a:fld>
             <a:endParaRPr lang="en-US"/>
           </a:p>
@@ -2094,7 +2107,7 @@
           <a:p>
             <a:fld id="{FE400534-9B4E-43CC-9E90-F3FF0615A88D}" type="datetimeFigureOut">
               <a:rPr lang="en-US" smtClean="0"/>
-              <a:t>10/30/2018</a:t>
+              <a:t>11/12/2018</a:t>
             </a:fld>
             <a:endParaRPr lang="en-US"/>
           </a:p>
@@ -2405,7 +2418,7 @@
           <a:p>
             <a:fld id="{FE400534-9B4E-43CC-9E90-F3FF0615A88D}" type="datetimeFigureOut">
               <a:rPr lang="en-US" smtClean="0"/>
-              <a:t>10/30/2018</a:t>
+              <a:t>11/12/2018</a:t>
             </a:fld>
             <a:endParaRPr lang="en-US"/>
           </a:p>
@@ -2693,7 +2706,7 @@
           <a:p>
             <a:fld id="{FE400534-9B4E-43CC-9E90-F3FF0615A88D}" type="datetimeFigureOut">
               <a:rPr lang="en-US" smtClean="0"/>
-              <a:t>10/30/2018</a:t>
+              <a:t>11/12/2018</a:t>
             </a:fld>
             <a:endParaRPr lang="en-US"/>
           </a:p>
@@ -2934,7 +2947,7 @@
           <a:p>
             <a:fld id="{FE400534-9B4E-43CC-9E90-F3FF0615A88D}" type="datetimeFigureOut">
               <a:rPr lang="en-US" smtClean="0"/>
-              <a:t>10/30/2018</a:t>
+              <a:t>11/12/2018</a:t>
             </a:fld>
             <a:endParaRPr lang="en-US"/>
           </a:p>
@@ -4981,6 +4994,516 @@
     <p:extLst>
       <p:ext uri="{BB962C8B-B14F-4D97-AF65-F5344CB8AC3E}">
         <p14:creationId xmlns:p14="http://schemas.microsoft.com/office/powerpoint/2010/main" val="1031475963"/>
+      </p:ext>
+    </p:extLst>
+  </p:cSld>
+  <p:clrMapOvr>
+    <a:masterClrMapping/>
+  </p:clrMapOvr>
+</p:sld>
+</file>
+
+<file path=ppt/slides/slide17.xml><?xml version="1.0" encoding="utf-8"?>
+<p:sld xmlns:a="http://schemas.openxmlformats.org/drawingml/2006/main" xmlns:r="http://schemas.openxmlformats.org/officeDocument/2006/relationships" xmlns:p="http://schemas.openxmlformats.org/presentationml/2006/main">
+  <p:cSld>
+    <p:spTree>
+      <p:nvGrpSpPr>
+        <p:cNvPr id="1" name=""/>
+        <p:cNvGrpSpPr/>
+        <p:nvPr/>
+      </p:nvGrpSpPr>
+      <p:grpSpPr>
+        <a:xfrm>
+          <a:off x="0" y="0"/>
+          <a:ext cx="0" cy="0"/>
+          <a:chOff x="0" y="0"/>
+          <a:chExt cx="0" cy="0"/>
+        </a:xfrm>
+      </p:grpSpPr>
+      <p:sp>
+        <p:nvSpPr>
+          <p:cNvPr id="2" name="Oval 1">
+            <a:extLst>
+              <a:ext uri="{FF2B5EF4-FFF2-40B4-BE49-F238E27FC236}">
+                <a16:creationId xmlns:a16="http://schemas.microsoft.com/office/drawing/2014/main" id="{935D0A8C-BAF1-4F40-BEFB-CF285A0529E1}"/>
+              </a:ext>
+            </a:extLst>
+          </p:cNvPr>
+          <p:cNvSpPr/>
+          <p:nvPr/>
+        </p:nvSpPr>
+        <p:spPr>
+          <a:xfrm>
+            <a:off x="5091343" y="479394"/>
+            <a:ext cx="1407111" cy="1278384"/>
+          </a:xfrm>
+          <a:prstGeom prst="ellipse">
+            <a:avLst/>
+          </a:prstGeom>
+          <a:solidFill>
+            <a:schemeClr val="bg1"/>
+          </a:solidFill>
+          <a:ln>
+            <a:solidFill>
+              <a:schemeClr val="tx1"/>
+            </a:solidFill>
+          </a:ln>
+        </p:spPr>
+        <p:style>
+          <a:lnRef idx="2">
+            <a:schemeClr val="accent1">
+              <a:shade val="50000"/>
+            </a:schemeClr>
+          </a:lnRef>
+          <a:fillRef idx="1">
+            <a:schemeClr val="accent1"/>
+          </a:fillRef>
+          <a:effectRef idx="0">
+            <a:schemeClr val="accent1"/>
+          </a:effectRef>
+          <a:fontRef idx="minor">
+            <a:schemeClr val="lt1"/>
+          </a:fontRef>
+        </p:style>
+        <p:txBody>
+          <a:bodyPr rtlCol="0" anchor="ctr"/>
+          <a:lstStyle/>
+          <a:p>
+            <a:pPr algn="ctr"/>
+            <a:r>
+              <a:rPr lang="en-US" dirty="0" err="1">
+                <a:solidFill>
+                  <a:sysClr val="windowText" lastClr="000000"/>
+                </a:solidFill>
+              </a:rPr>
+              <a:t>DevType</a:t>
+            </a:r>
+            <a:endParaRPr lang="en-US" dirty="0">
+              <a:solidFill>
+                <a:sysClr val="windowText" lastClr="000000"/>
+              </a:solidFill>
+            </a:endParaRPr>
+          </a:p>
+        </p:txBody>
+      </p:sp>
+      <p:cxnSp>
+        <p:nvCxnSpPr>
+          <p:cNvPr id="4" name="Straight Connector 3">
+            <a:extLst>
+              <a:ext uri="{FF2B5EF4-FFF2-40B4-BE49-F238E27FC236}">
+                <a16:creationId xmlns:a16="http://schemas.microsoft.com/office/drawing/2014/main" id="{D6D9F5A7-CAD4-40ED-A3B2-91554444572C}"/>
+              </a:ext>
+            </a:extLst>
+          </p:cNvPr>
+          <p:cNvCxnSpPr>
+            <a:cxnSpLocks/>
+            <a:stCxn id="2" idx="2"/>
+          </p:cNvCxnSpPr>
+          <p:nvPr/>
+        </p:nvCxnSpPr>
+        <p:spPr>
+          <a:xfrm flipH="1">
+            <a:off x="870012" y="1118586"/>
+            <a:ext cx="4221331" cy="1331651"/>
+          </a:xfrm>
+          <a:prstGeom prst="line">
+            <a:avLst/>
+          </a:prstGeom>
+          <a:ln>
+            <a:solidFill>
+              <a:schemeClr val="tx1"/>
+            </a:solidFill>
+          </a:ln>
+        </p:spPr>
+        <p:style>
+          <a:lnRef idx="1">
+            <a:schemeClr val="accent1"/>
+          </a:lnRef>
+          <a:fillRef idx="0">
+            <a:schemeClr val="accent1"/>
+          </a:fillRef>
+          <a:effectRef idx="0">
+            <a:schemeClr val="accent1"/>
+          </a:effectRef>
+          <a:fontRef idx="minor">
+            <a:schemeClr val="tx1"/>
+          </a:fontRef>
+        </p:style>
+      </p:cxnSp>
+      <p:sp>
+        <p:nvSpPr>
+          <p:cNvPr id="7" name="TextBox 6">
+            <a:extLst>
+              <a:ext uri="{FF2B5EF4-FFF2-40B4-BE49-F238E27FC236}">
+                <a16:creationId xmlns:a16="http://schemas.microsoft.com/office/drawing/2014/main" id="{4EDD9F41-735E-4B6A-85C5-EAD14A26C044}"/>
+              </a:ext>
+            </a:extLst>
+          </p:cNvPr>
+          <p:cNvSpPr txBox="1"/>
+          <p:nvPr/>
+        </p:nvSpPr>
+        <p:spPr>
+          <a:xfrm>
+            <a:off x="652508" y="1388446"/>
+            <a:ext cx="2758769" cy="369332"/>
+          </a:xfrm>
+          <a:prstGeom prst="rect">
+            <a:avLst/>
+          </a:prstGeom>
+          <a:noFill/>
+        </p:spPr>
+        <p:txBody>
+          <a:bodyPr wrap="square" rtlCol="0">
+            <a:spAutoFit/>
+          </a:bodyPr>
+          <a:lstStyle/>
+          <a:p>
+            <a:r>
+              <a:rPr lang="en-US" dirty="0" err="1"/>
+              <a:t>FullStack;Back</a:t>
+            </a:r>
+            <a:r>
+              <a:rPr lang="en-US" dirty="0"/>
+              <a:t> End; DevOps</a:t>
+            </a:r>
+          </a:p>
+        </p:txBody>
+      </p:sp>
+      <p:cxnSp>
+        <p:nvCxnSpPr>
+          <p:cNvPr id="9" name="Straight Connector 8">
+            <a:extLst>
+              <a:ext uri="{FF2B5EF4-FFF2-40B4-BE49-F238E27FC236}">
+                <a16:creationId xmlns:a16="http://schemas.microsoft.com/office/drawing/2014/main" id="{10445D48-93CB-460B-8741-081726AF299F}"/>
+              </a:ext>
+            </a:extLst>
+          </p:cNvPr>
+          <p:cNvCxnSpPr>
+            <a:stCxn id="2" idx="3"/>
+          </p:cNvCxnSpPr>
+          <p:nvPr/>
+        </p:nvCxnSpPr>
+        <p:spPr>
+          <a:xfrm flipH="1">
+            <a:off x="4518734" y="1570563"/>
+            <a:ext cx="778676" cy="879674"/>
+          </a:xfrm>
+          <a:prstGeom prst="line">
+            <a:avLst/>
+          </a:prstGeom>
+          <a:ln>
+            <a:solidFill>
+              <a:schemeClr val="tx1"/>
+            </a:solidFill>
+          </a:ln>
+        </p:spPr>
+        <p:style>
+          <a:lnRef idx="1">
+            <a:schemeClr val="accent1"/>
+          </a:lnRef>
+          <a:fillRef idx="0">
+            <a:schemeClr val="accent1"/>
+          </a:fillRef>
+          <a:effectRef idx="0">
+            <a:schemeClr val="accent1"/>
+          </a:effectRef>
+          <a:fontRef idx="minor">
+            <a:schemeClr val="tx1"/>
+          </a:fontRef>
+        </p:style>
+      </p:cxnSp>
+      <p:sp>
+        <p:nvSpPr>
+          <p:cNvPr id="10" name="TextBox 9">
+            <a:extLst>
+              <a:ext uri="{FF2B5EF4-FFF2-40B4-BE49-F238E27FC236}">
+                <a16:creationId xmlns:a16="http://schemas.microsoft.com/office/drawing/2014/main" id="{DD19835D-2F25-4B44-8E07-6AEDBE8CE2F6}"/>
+              </a:ext>
+            </a:extLst>
+          </p:cNvPr>
+          <p:cNvSpPr txBox="1"/>
+          <p:nvPr/>
+        </p:nvSpPr>
+        <p:spPr>
+          <a:xfrm>
+            <a:off x="1896499" y="2010400"/>
+            <a:ext cx="2842381" cy="369332"/>
+          </a:xfrm>
+          <a:prstGeom prst="rect">
+            <a:avLst/>
+          </a:prstGeom>
+          <a:noFill/>
+        </p:spPr>
+        <p:txBody>
+          <a:bodyPr wrap="square" rtlCol="0">
+            <a:spAutoFit/>
+          </a:bodyPr>
+          <a:lstStyle/>
+          <a:p>
+            <a:r>
+              <a:rPr lang="en-US" dirty="0" err="1"/>
+              <a:t>FullStack;Database</a:t>
+            </a:r>
+            <a:r>
+              <a:rPr lang="en-US" dirty="0"/>
+              <a:t> Manager</a:t>
+            </a:r>
+          </a:p>
+        </p:txBody>
+      </p:sp>
+      <p:cxnSp>
+        <p:nvCxnSpPr>
+          <p:cNvPr id="13" name="Straight Connector 12">
+            <a:extLst>
+              <a:ext uri="{FF2B5EF4-FFF2-40B4-BE49-F238E27FC236}">
+                <a16:creationId xmlns:a16="http://schemas.microsoft.com/office/drawing/2014/main" id="{628387F7-CEFD-4930-B853-A7B4433927D3}"/>
+              </a:ext>
+            </a:extLst>
+          </p:cNvPr>
+          <p:cNvCxnSpPr>
+            <a:stCxn id="2" idx="4"/>
+          </p:cNvCxnSpPr>
+          <p:nvPr/>
+        </p:nvCxnSpPr>
+        <p:spPr>
+          <a:xfrm flipH="1">
+            <a:off x="5794898" y="1757778"/>
+            <a:ext cx="1" cy="692459"/>
+          </a:xfrm>
+          <a:prstGeom prst="line">
+            <a:avLst/>
+          </a:prstGeom>
+          <a:ln>
+            <a:solidFill>
+              <a:schemeClr val="tx1"/>
+            </a:solidFill>
+          </a:ln>
+        </p:spPr>
+        <p:style>
+          <a:lnRef idx="1">
+            <a:schemeClr val="accent1"/>
+          </a:lnRef>
+          <a:fillRef idx="0">
+            <a:schemeClr val="accent1"/>
+          </a:fillRef>
+          <a:effectRef idx="0">
+            <a:schemeClr val="accent1"/>
+          </a:effectRef>
+          <a:fontRef idx="minor">
+            <a:schemeClr val="tx1"/>
+          </a:fontRef>
+        </p:style>
+      </p:cxnSp>
+      <p:sp>
+        <p:nvSpPr>
+          <p:cNvPr id="14" name="TextBox 13">
+            <a:extLst>
+              <a:ext uri="{FF2B5EF4-FFF2-40B4-BE49-F238E27FC236}">
+                <a16:creationId xmlns:a16="http://schemas.microsoft.com/office/drawing/2014/main" id="{8A2B6F10-7D0E-43E3-BBC9-26EC5E06AD72}"/>
+              </a:ext>
+            </a:extLst>
+          </p:cNvPr>
+          <p:cNvSpPr txBox="1"/>
+          <p:nvPr/>
+        </p:nvSpPr>
+        <p:spPr>
+          <a:xfrm>
+            <a:off x="4886587" y="1919341"/>
+            <a:ext cx="1919500" cy="369332"/>
+          </a:xfrm>
+          <a:prstGeom prst="rect">
+            <a:avLst/>
+          </a:prstGeom>
+          <a:noFill/>
+        </p:spPr>
+        <p:txBody>
+          <a:bodyPr wrap="square" rtlCol="0">
+            <a:spAutoFit/>
+          </a:bodyPr>
+          <a:lstStyle/>
+          <a:p>
+            <a:r>
+              <a:rPr lang="en-US" dirty="0" err="1"/>
+              <a:t>FullStack;Back</a:t>
+            </a:r>
+            <a:r>
+              <a:rPr lang="en-US" dirty="0"/>
+              <a:t> End</a:t>
+            </a:r>
+          </a:p>
+        </p:txBody>
+      </p:sp>
+      <p:cxnSp>
+        <p:nvCxnSpPr>
+          <p:cNvPr id="16" name="Straight Connector 15">
+            <a:extLst>
+              <a:ext uri="{FF2B5EF4-FFF2-40B4-BE49-F238E27FC236}">
+                <a16:creationId xmlns:a16="http://schemas.microsoft.com/office/drawing/2014/main" id="{9F00724D-B3D9-48B1-91E1-2E419A4BC31A}"/>
+              </a:ext>
+            </a:extLst>
+          </p:cNvPr>
+          <p:cNvCxnSpPr>
+            <a:stCxn id="2" idx="5"/>
+          </p:cNvCxnSpPr>
+          <p:nvPr/>
+        </p:nvCxnSpPr>
+        <p:spPr>
+          <a:xfrm>
+            <a:off x="6292387" y="1570563"/>
+            <a:ext cx="1040568" cy="809169"/>
+          </a:xfrm>
+          <a:prstGeom prst="line">
+            <a:avLst/>
+          </a:prstGeom>
+          <a:ln>
+            <a:solidFill>
+              <a:schemeClr val="tx1"/>
+            </a:solidFill>
+          </a:ln>
+        </p:spPr>
+        <p:style>
+          <a:lnRef idx="1">
+            <a:schemeClr val="accent1"/>
+          </a:lnRef>
+          <a:fillRef idx="0">
+            <a:schemeClr val="accent1"/>
+          </a:fillRef>
+          <a:effectRef idx="0">
+            <a:schemeClr val="accent1"/>
+          </a:effectRef>
+          <a:fontRef idx="minor">
+            <a:schemeClr val="tx1"/>
+          </a:fontRef>
+        </p:style>
+      </p:cxnSp>
+      <p:sp>
+        <p:nvSpPr>
+          <p:cNvPr id="17" name="TextBox 16">
+            <a:extLst>
+              <a:ext uri="{FF2B5EF4-FFF2-40B4-BE49-F238E27FC236}">
+                <a16:creationId xmlns:a16="http://schemas.microsoft.com/office/drawing/2014/main" id="{8AC732FC-AA8C-4098-8FC9-CD4AC7FD1CD6}"/>
+              </a:ext>
+            </a:extLst>
+          </p:cNvPr>
+          <p:cNvSpPr txBox="1"/>
+          <p:nvPr/>
+        </p:nvSpPr>
+        <p:spPr>
+          <a:xfrm>
+            <a:off x="7303575" y="2014447"/>
+            <a:ext cx="3062762" cy="369332"/>
+          </a:xfrm>
+          <a:prstGeom prst="rect">
+            <a:avLst/>
+          </a:prstGeom>
+          <a:noFill/>
+        </p:spPr>
+        <p:txBody>
+          <a:bodyPr wrap="square" rtlCol="0">
+            <a:spAutoFit/>
+          </a:bodyPr>
+          <a:lstStyle/>
+          <a:p>
+            <a:r>
+              <a:rPr lang="en-US" dirty="0"/>
+              <a:t>Engineering </a:t>
+            </a:r>
+            <a:r>
+              <a:rPr lang="en-US" dirty="0" err="1"/>
+              <a:t>Manager;Fullstack</a:t>
+            </a:r>
+            <a:endParaRPr lang="en-US" dirty="0"/>
+          </a:p>
+        </p:txBody>
+      </p:sp>
+      <p:cxnSp>
+        <p:nvCxnSpPr>
+          <p:cNvPr id="19" name="Straight Connector 18">
+            <a:extLst>
+              <a:ext uri="{FF2B5EF4-FFF2-40B4-BE49-F238E27FC236}">
+                <a16:creationId xmlns:a16="http://schemas.microsoft.com/office/drawing/2014/main" id="{41049518-5D13-4E75-9D29-8EEF03A46DD4}"/>
+              </a:ext>
+            </a:extLst>
+          </p:cNvPr>
+          <p:cNvCxnSpPr>
+            <a:stCxn id="2" idx="6"/>
+          </p:cNvCxnSpPr>
+          <p:nvPr/>
+        </p:nvCxnSpPr>
+        <p:spPr>
+          <a:xfrm>
+            <a:off x="6498454" y="1118586"/>
+            <a:ext cx="5370991" cy="1261146"/>
+          </a:xfrm>
+          <a:prstGeom prst="line">
+            <a:avLst/>
+          </a:prstGeom>
+          <a:ln>
+            <a:solidFill>
+              <a:schemeClr val="tx1"/>
+            </a:solidFill>
+          </a:ln>
+        </p:spPr>
+        <p:style>
+          <a:lnRef idx="1">
+            <a:schemeClr val="accent1"/>
+          </a:lnRef>
+          <a:fillRef idx="0">
+            <a:schemeClr val="accent1"/>
+          </a:fillRef>
+          <a:effectRef idx="0">
+            <a:schemeClr val="accent1"/>
+          </a:effectRef>
+          <a:fontRef idx="minor">
+            <a:schemeClr val="tx1"/>
+          </a:fontRef>
+        </p:style>
+      </p:cxnSp>
+      <p:sp>
+        <p:nvSpPr>
+          <p:cNvPr id="20" name="TextBox 19">
+            <a:extLst>
+              <a:ext uri="{FF2B5EF4-FFF2-40B4-BE49-F238E27FC236}">
+                <a16:creationId xmlns:a16="http://schemas.microsoft.com/office/drawing/2014/main" id="{F4E22D25-1E8B-4B3B-94EE-4F7A9E4C6232}"/>
+              </a:ext>
+            </a:extLst>
+          </p:cNvPr>
+          <p:cNvSpPr txBox="1"/>
+          <p:nvPr/>
+        </p:nvSpPr>
+        <p:spPr>
+          <a:xfrm>
+            <a:off x="7332955" y="1149743"/>
+            <a:ext cx="4468467" cy="646331"/>
+          </a:xfrm>
+          <a:prstGeom prst="rect">
+            <a:avLst/>
+          </a:prstGeom>
+          <a:noFill/>
+        </p:spPr>
+        <p:txBody>
+          <a:bodyPr wrap="square" rtlCol="0">
+            <a:spAutoFit/>
+          </a:bodyPr>
+          <a:lstStyle/>
+          <a:p>
+            <a:r>
+              <a:rPr lang="en-US" dirty="0"/>
+              <a:t>Desktop or enterprise applications developer;</a:t>
+            </a:r>
+          </a:p>
+          <a:p>
+            <a:r>
+              <a:rPr lang="en-US" dirty="0"/>
+              <a:t>Back End</a:t>
+            </a:r>
+          </a:p>
+        </p:txBody>
+      </p:sp>
+    </p:spTree>
+    <p:extLst>
+      <p:ext uri="{BB962C8B-B14F-4D97-AF65-F5344CB8AC3E}">
+        <p14:creationId xmlns:p14="http://schemas.microsoft.com/office/powerpoint/2010/main" val="4228913185"/>
       </p:ext>
     </p:extLst>
   </p:cSld>

</xml_diff>

<commit_message>
Updated report and presentation to reflect current understanding
After talking to Doucette doing Sci-kit learn implementation of things
</commit_message>
<xml_diff>
--- a/Presentations/For Me/Presentation.pptx
+++ b/Presentations/For Me/Presentation.pptx
@@ -287,7 +287,7 @@
           <a:p>
             <a:fld id="{FE400534-9B4E-43CC-9E90-F3FF0615A88D}" type="datetimeFigureOut">
               <a:rPr lang="en-US" smtClean="0"/>
-              <a:t>11/12/2018</a:t>
+              <a:t>11/13/2018</a:t>
             </a:fld>
             <a:endParaRPr lang="en-US"/>
           </a:p>
@@ -490,7 +490,7 @@
           <a:p>
             <a:fld id="{FE400534-9B4E-43CC-9E90-F3FF0615A88D}" type="datetimeFigureOut">
               <a:rPr lang="en-US" smtClean="0"/>
-              <a:t>11/12/2018</a:t>
+              <a:t>11/13/2018</a:t>
             </a:fld>
             <a:endParaRPr lang="en-US"/>
           </a:p>
@@ -698,7 +698,7 @@
           <a:p>
             <a:fld id="{FE400534-9B4E-43CC-9E90-F3FF0615A88D}" type="datetimeFigureOut">
               <a:rPr lang="en-US" smtClean="0"/>
-              <a:t>11/12/2018</a:t>
+              <a:t>11/13/2018</a:t>
             </a:fld>
             <a:endParaRPr lang="en-US"/>
           </a:p>
@@ -896,7 +896,7 @@
           <a:p>
             <a:fld id="{FE400534-9B4E-43CC-9E90-F3FF0615A88D}" type="datetimeFigureOut">
               <a:rPr lang="en-US" smtClean="0"/>
-              <a:t>11/12/2018</a:t>
+              <a:t>11/13/2018</a:t>
             </a:fld>
             <a:endParaRPr lang="en-US"/>
           </a:p>
@@ -1171,7 +1171,7 @@
           <a:p>
             <a:fld id="{FE400534-9B4E-43CC-9E90-F3FF0615A88D}" type="datetimeFigureOut">
               <a:rPr lang="en-US" smtClean="0"/>
-              <a:t>11/12/2018</a:t>
+              <a:t>11/13/2018</a:t>
             </a:fld>
             <a:endParaRPr lang="en-US"/>
           </a:p>
@@ -1441,7 +1441,7 @@
           <a:p>
             <a:fld id="{FE400534-9B4E-43CC-9E90-F3FF0615A88D}" type="datetimeFigureOut">
               <a:rPr lang="en-US" smtClean="0"/>
-              <a:t>11/12/2018</a:t>
+              <a:t>11/13/2018</a:t>
             </a:fld>
             <a:endParaRPr lang="en-US"/>
           </a:p>
@@ -1853,7 +1853,7 @@
           <a:p>
             <a:fld id="{FE400534-9B4E-43CC-9E90-F3FF0615A88D}" type="datetimeFigureOut">
               <a:rPr lang="en-US" smtClean="0"/>
-              <a:t>11/12/2018</a:t>
+              <a:t>11/13/2018</a:t>
             </a:fld>
             <a:endParaRPr lang="en-US"/>
           </a:p>
@@ -1994,7 +1994,7 @@
           <a:p>
             <a:fld id="{FE400534-9B4E-43CC-9E90-F3FF0615A88D}" type="datetimeFigureOut">
               <a:rPr lang="en-US" smtClean="0"/>
-              <a:t>11/12/2018</a:t>
+              <a:t>11/13/2018</a:t>
             </a:fld>
             <a:endParaRPr lang="en-US"/>
           </a:p>
@@ -2107,7 +2107,7 @@
           <a:p>
             <a:fld id="{FE400534-9B4E-43CC-9E90-F3FF0615A88D}" type="datetimeFigureOut">
               <a:rPr lang="en-US" smtClean="0"/>
-              <a:t>11/12/2018</a:t>
+              <a:t>11/13/2018</a:t>
             </a:fld>
             <a:endParaRPr lang="en-US"/>
           </a:p>
@@ -2418,7 +2418,7 @@
           <a:p>
             <a:fld id="{FE400534-9B4E-43CC-9E90-F3FF0615A88D}" type="datetimeFigureOut">
               <a:rPr lang="en-US" smtClean="0"/>
-              <a:t>11/12/2018</a:t>
+              <a:t>11/13/2018</a:t>
             </a:fld>
             <a:endParaRPr lang="en-US"/>
           </a:p>
@@ -2706,7 +2706,7 @@
           <a:p>
             <a:fld id="{FE400534-9B4E-43CC-9E90-F3FF0615A88D}" type="datetimeFigureOut">
               <a:rPr lang="en-US" smtClean="0"/>
-              <a:t>11/12/2018</a:t>
+              <a:t>11/13/2018</a:t>
             </a:fld>
             <a:endParaRPr lang="en-US"/>
           </a:p>
@@ -2947,7 +2947,7 @@
           <a:p>
             <a:fld id="{FE400534-9B4E-43CC-9E90-F3FF0615A88D}" type="datetimeFigureOut">
               <a:rPr lang="en-US" smtClean="0"/>
-              <a:t>11/12/2018</a:t>
+              <a:t>11/13/2018</a:t>
             </a:fld>
             <a:endParaRPr lang="en-US"/>
           </a:p>
@@ -5034,8 +5034,8 @@
         </p:nvSpPr>
         <p:spPr>
           <a:xfrm>
-            <a:off x="5091343" y="479394"/>
-            <a:ext cx="1407111" cy="1278384"/>
+            <a:off x="3755255" y="479394"/>
+            <a:ext cx="2743200" cy="1278384"/>
           </a:xfrm>
           <a:prstGeom prst="ellipse">
             <a:avLst/>
@@ -5076,35 +5076,38 @@
                   <a:sysClr val="windowText" lastClr="000000"/>
                 </a:solidFill>
               </a:rPr>
-              <a:t>DevType</a:t>
-            </a:r>
-            <a:endParaRPr lang="en-US" dirty="0">
-              <a:solidFill>
-                <a:sysClr val="windowText" lastClr="000000"/>
-              </a:solidFill>
-            </a:endParaRPr>
+              <a:t>DevType.Full</a:t>
+            </a:r>
+            <a:r>
+              <a:rPr lang="en-US" dirty="0">
+                <a:solidFill>
+                  <a:sysClr val="windowText" lastClr="000000"/>
+                </a:solidFill>
+              </a:rPr>
+              <a:t> Stack</a:t>
+            </a:r>
           </a:p>
         </p:txBody>
       </p:sp>
       <p:cxnSp>
         <p:nvCxnSpPr>
-          <p:cNvPr id="4" name="Straight Connector 3">
-            <a:extLst>
-              <a:ext uri="{FF2B5EF4-FFF2-40B4-BE49-F238E27FC236}">
-                <a16:creationId xmlns:a16="http://schemas.microsoft.com/office/drawing/2014/main" id="{D6D9F5A7-CAD4-40ED-A3B2-91554444572C}"/>
+          <p:cNvPr id="9" name="Straight Connector 8">
+            <a:extLst>
+              <a:ext uri="{FF2B5EF4-FFF2-40B4-BE49-F238E27FC236}">
+                <a16:creationId xmlns:a16="http://schemas.microsoft.com/office/drawing/2014/main" id="{10445D48-93CB-460B-8741-081726AF299F}"/>
               </a:ext>
             </a:extLst>
           </p:cNvPr>
           <p:cNvCxnSpPr>
             <a:cxnSpLocks/>
-            <a:stCxn id="2" idx="2"/>
+            <a:stCxn id="2" idx="3"/>
           </p:cNvCxnSpPr>
           <p:nvPr/>
         </p:nvCxnSpPr>
         <p:spPr>
           <a:xfrm flipH="1">
-            <a:off x="870012" y="1118586"/>
-            <a:ext cx="4221331" cy="1331651"/>
+            <a:off x="3177973" y="1570563"/>
+            <a:ext cx="979014" cy="809169"/>
           </a:xfrm>
           <a:prstGeom prst="line">
             <a:avLst/>
@@ -5132,10 +5135,10 @@
       </p:cxnSp>
       <p:sp>
         <p:nvSpPr>
-          <p:cNvPr id="7" name="TextBox 6">
-            <a:extLst>
-              <a:ext uri="{FF2B5EF4-FFF2-40B4-BE49-F238E27FC236}">
-                <a16:creationId xmlns:a16="http://schemas.microsoft.com/office/drawing/2014/main" id="{4EDD9F41-735E-4B6A-85C5-EAD14A26C044}"/>
+          <p:cNvPr id="10" name="TextBox 9">
+            <a:extLst>
+              <a:ext uri="{FF2B5EF4-FFF2-40B4-BE49-F238E27FC236}">
+                <a16:creationId xmlns:a16="http://schemas.microsoft.com/office/drawing/2014/main" id="{DD19835D-2F25-4B44-8E07-6AEDBE8CE2F6}"/>
               </a:ext>
             </a:extLst>
           </p:cNvPr>
@@ -5144,8 +5147,8 @@
         </p:nvSpPr>
         <p:spPr>
           <a:xfrm>
-            <a:off x="652508" y="1388446"/>
-            <a:ext cx="2758769" cy="369332"/>
+            <a:off x="3051581" y="1732642"/>
+            <a:ext cx="616070" cy="369332"/>
           </a:xfrm>
           <a:prstGeom prst="rect">
             <a:avLst/>
@@ -5159,34 +5162,31 @@
           <a:lstStyle/>
           <a:p>
             <a:r>
-              <a:rPr lang="en-US" dirty="0" err="1"/>
-              <a:t>FullStack;Back</a:t>
-            </a:r>
-            <a:r>
               <a:rPr lang="en-US" dirty="0"/>
-              <a:t> End; DevOps</a:t>
+              <a:t>Yes</a:t>
             </a:r>
           </a:p>
         </p:txBody>
       </p:sp>
       <p:cxnSp>
         <p:nvCxnSpPr>
-          <p:cNvPr id="9" name="Straight Connector 8">
-            <a:extLst>
-              <a:ext uri="{FF2B5EF4-FFF2-40B4-BE49-F238E27FC236}">
-                <a16:creationId xmlns:a16="http://schemas.microsoft.com/office/drawing/2014/main" id="{10445D48-93CB-460B-8741-081726AF299F}"/>
+          <p:cNvPr id="16" name="Straight Connector 15">
+            <a:extLst>
+              <a:ext uri="{FF2B5EF4-FFF2-40B4-BE49-F238E27FC236}">
+                <a16:creationId xmlns:a16="http://schemas.microsoft.com/office/drawing/2014/main" id="{9F00724D-B3D9-48B1-91E1-2E419A4BC31A}"/>
               </a:ext>
             </a:extLst>
           </p:cNvPr>
           <p:cNvCxnSpPr>
-            <a:stCxn id="2" idx="3"/>
+            <a:cxnSpLocks/>
+            <a:stCxn id="2" idx="5"/>
           </p:cNvCxnSpPr>
           <p:nvPr/>
         </p:nvCxnSpPr>
         <p:spPr>
-          <a:xfrm flipH="1">
-            <a:off x="4518734" y="1570563"/>
-            <a:ext cx="778676" cy="879674"/>
+          <a:xfrm>
+            <a:off x="6096723" y="1570563"/>
+            <a:ext cx="801227" cy="809169"/>
           </a:xfrm>
           <a:prstGeom prst="line">
             <a:avLst/>
@@ -5214,10 +5214,10 @@
       </p:cxnSp>
       <p:sp>
         <p:nvSpPr>
-          <p:cNvPr id="10" name="TextBox 9">
-            <a:extLst>
-              <a:ext uri="{FF2B5EF4-FFF2-40B4-BE49-F238E27FC236}">
-                <a16:creationId xmlns:a16="http://schemas.microsoft.com/office/drawing/2014/main" id="{DD19835D-2F25-4B44-8E07-6AEDBE8CE2F6}"/>
+          <p:cNvPr id="17" name="TextBox 16">
+            <a:extLst>
+              <a:ext uri="{FF2B5EF4-FFF2-40B4-BE49-F238E27FC236}">
+                <a16:creationId xmlns:a16="http://schemas.microsoft.com/office/drawing/2014/main" id="{8AC732FC-AA8C-4098-8FC9-CD4AC7FD1CD6}"/>
               </a:ext>
             </a:extLst>
           </p:cNvPr>
@@ -5226,8 +5226,8 @@
         </p:nvSpPr>
         <p:spPr>
           <a:xfrm>
-            <a:off x="1896499" y="2010400"/>
-            <a:ext cx="2842381" cy="369332"/>
+            <a:off x="6557408" y="1732642"/>
+            <a:ext cx="518329" cy="369332"/>
           </a:xfrm>
           <a:prstGeom prst="rect">
             <a:avLst/>
@@ -5241,261 +5241,8 @@
           <a:lstStyle/>
           <a:p>
             <a:r>
-              <a:rPr lang="en-US" dirty="0" err="1"/>
-              <a:t>FullStack;Database</a:t>
-            </a:r>
-            <a:r>
               <a:rPr lang="en-US" dirty="0"/>
-              <a:t> Manager</a:t>
-            </a:r>
-          </a:p>
-        </p:txBody>
-      </p:sp>
-      <p:cxnSp>
-        <p:nvCxnSpPr>
-          <p:cNvPr id="13" name="Straight Connector 12">
-            <a:extLst>
-              <a:ext uri="{FF2B5EF4-FFF2-40B4-BE49-F238E27FC236}">
-                <a16:creationId xmlns:a16="http://schemas.microsoft.com/office/drawing/2014/main" id="{628387F7-CEFD-4930-B853-A7B4433927D3}"/>
-              </a:ext>
-            </a:extLst>
-          </p:cNvPr>
-          <p:cNvCxnSpPr>
-            <a:stCxn id="2" idx="4"/>
-          </p:cNvCxnSpPr>
-          <p:nvPr/>
-        </p:nvCxnSpPr>
-        <p:spPr>
-          <a:xfrm flipH="1">
-            <a:off x="5794898" y="1757778"/>
-            <a:ext cx="1" cy="692459"/>
-          </a:xfrm>
-          <a:prstGeom prst="line">
-            <a:avLst/>
-          </a:prstGeom>
-          <a:ln>
-            <a:solidFill>
-              <a:schemeClr val="tx1"/>
-            </a:solidFill>
-          </a:ln>
-        </p:spPr>
-        <p:style>
-          <a:lnRef idx="1">
-            <a:schemeClr val="accent1"/>
-          </a:lnRef>
-          <a:fillRef idx="0">
-            <a:schemeClr val="accent1"/>
-          </a:fillRef>
-          <a:effectRef idx="0">
-            <a:schemeClr val="accent1"/>
-          </a:effectRef>
-          <a:fontRef idx="minor">
-            <a:schemeClr val="tx1"/>
-          </a:fontRef>
-        </p:style>
-      </p:cxnSp>
-      <p:sp>
-        <p:nvSpPr>
-          <p:cNvPr id="14" name="TextBox 13">
-            <a:extLst>
-              <a:ext uri="{FF2B5EF4-FFF2-40B4-BE49-F238E27FC236}">
-                <a16:creationId xmlns:a16="http://schemas.microsoft.com/office/drawing/2014/main" id="{8A2B6F10-7D0E-43E3-BBC9-26EC5E06AD72}"/>
-              </a:ext>
-            </a:extLst>
-          </p:cNvPr>
-          <p:cNvSpPr txBox="1"/>
-          <p:nvPr/>
-        </p:nvSpPr>
-        <p:spPr>
-          <a:xfrm>
-            <a:off x="4886587" y="1919341"/>
-            <a:ext cx="1919500" cy="369332"/>
-          </a:xfrm>
-          <a:prstGeom prst="rect">
-            <a:avLst/>
-          </a:prstGeom>
-          <a:noFill/>
-        </p:spPr>
-        <p:txBody>
-          <a:bodyPr wrap="square" rtlCol="0">
-            <a:spAutoFit/>
-          </a:bodyPr>
-          <a:lstStyle/>
-          <a:p>
-            <a:r>
-              <a:rPr lang="en-US" dirty="0" err="1"/>
-              <a:t>FullStack;Back</a:t>
-            </a:r>
-            <a:r>
-              <a:rPr lang="en-US" dirty="0"/>
-              <a:t> End</a:t>
-            </a:r>
-          </a:p>
-        </p:txBody>
-      </p:sp>
-      <p:cxnSp>
-        <p:nvCxnSpPr>
-          <p:cNvPr id="16" name="Straight Connector 15">
-            <a:extLst>
-              <a:ext uri="{FF2B5EF4-FFF2-40B4-BE49-F238E27FC236}">
-                <a16:creationId xmlns:a16="http://schemas.microsoft.com/office/drawing/2014/main" id="{9F00724D-B3D9-48B1-91E1-2E419A4BC31A}"/>
-              </a:ext>
-            </a:extLst>
-          </p:cNvPr>
-          <p:cNvCxnSpPr>
-            <a:stCxn id="2" idx="5"/>
-          </p:cNvCxnSpPr>
-          <p:nvPr/>
-        </p:nvCxnSpPr>
-        <p:spPr>
-          <a:xfrm>
-            <a:off x="6292387" y="1570563"/>
-            <a:ext cx="1040568" cy="809169"/>
-          </a:xfrm>
-          <a:prstGeom prst="line">
-            <a:avLst/>
-          </a:prstGeom>
-          <a:ln>
-            <a:solidFill>
-              <a:schemeClr val="tx1"/>
-            </a:solidFill>
-          </a:ln>
-        </p:spPr>
-        <p:style>
-          <a:lnRef idx="1">
-            <a:schemeClr val="accent1"/>
-          </a:lnRef>
-          <a:fillRef idx="0">
-            <a:schemeClr val="accent1"/>
-          </a:fillRef>
-          <a:effectRef idx="0">
-            <a:schemeClr val="accent1"/>
-          </a:effectRef>
-          <a:fontRef idx="minor">
-            <a:schemeClr val="tx1"/>
-          </a:fontRef>
-        </p:style>
-      </p:cxnSp>
-      <p:sp>
-        <p:nvSpPr>
-          <p:cNvPr id="17" name="TextBox 16">
-            <a:extLst>
-              <a:ext uri="{FF2B5EF4-FFF2-40B4-BE49-F238E27FC236}">
-                <a16:creationId xmlns:a16="http://schemas.microsoft.com/office/drawing/2014/main" id="{8AC732FC-AA8C-4098-8FC9-CD4AC7FD1CD6}"/>
-              </a:ext>
-            </a:extLst>
-          </p:cNvPr>
-          <p:cNvSpPr txBox="1"/>
-          <p:nvPr/>
-        </p:nvSpPr>
-        <p:spPr>
-          <a:xfrm>
-            <a:off x="7303575" y="2014447"/>
-            <a:ext cx="3062762" cy="369332"/>
-          </a:xfrm>
-          <a:prstGeom prst="rect">
-            <a:avLst/>
-          </a:prstGeom>
-          <a:noFill/>
-        </p:spPr>
-        <p:txBody>
-          <a:bodyPr wrap="square" rtlCol="0">
-            <a:spAutoFit/>
-          </a:bodyPr>
-          <a:lstStyle/>
-          <a:p>
-            <a:r>
-              <a:rPr lang="en-US" dirty="0"/>
-              <a:t>Engineering </a:t>
-            </a:r>
-            <a:r>
-              <a:rPr lang="en-US" dirty="0" err="1"/>
-              <a:t>Manager;Fullstack</a:t>
-            </a:r>
-            <a:endParaRPr lang="en-US" dirty="0"/>
-          </a:p>
-        </p:txBody>
-      </p:sp>
-      <p:cxnSp>
-        <p:nvCxnSpPr>
-          <p:cNvPr id="19" name="Straight Connector 18">
-            <a:extLst>
-              <a:ext uri="{FF2B5EF4-FFF2-40B4-BE49-F238E27FC236}">
-                <a16:creationId xmlns:a16="http://schemas.microsoft.com/office/drawing/2014/main" id="{41049518-5D13-4E75-9D29-8EEF03A46DD4}"/>
-              </a:ext>
-            </a:extLst>
-          </p:cNvPr>
-          <p:cNvCxnSpPr>
-            <a:stCxn id="2" idx="6"/>
-          </p:cNvCxnSpPr>
-          <p:nvPr/>
-        </p:nvCxnSpPr>
-        <p:spPr>
-          <a:xfrm>
-            <a:off x="6498454" y="1118586"/>
-            <a:ext cx="5370991" cy="1261146"/>
-          </a:xfrm>
-          <a:prstGeom prst="line">
-            <a:avLst/>
-          </a:prstGeom>
-          <a:ln>
-            <a:solidFill>
-              <a:schemeClr val="tx1"/>
-            </a:solidFill>
-          </a:ln>
-        </p:spPr>
-        <p:style>
-          <a:lnRef idx="1">
-            <a:schemeClr val="accent1"/>
-          </a:lnRef>
-          <a:fillRef idx="0">
-            <a:schemeClr val="accent1"/>
-          </a:fillRef>
-          <a:effectRef idx="0">
-            <a:schemeClr val="accent1"/>
-          </a:effectRef>
-          <a:fontRef idx="minor">
-            <a:schemeClr val="tx1"/>
-          </a:fontRef>
-        </p:style>
-      </p:cxnSp>
-      <p:sp>
-        <p:nvSpPr>
-          <p:cNvPr id="20" name="TextBox 19">
-            <a:extLst>
-              <a:ext uri="{FF2B5EF4-FFF2-40B4-BE49-F238E27FC236}">
-                <a16:creationId xmlns:a16="http://schemas.microsoft.com/office/drawing/2014/main" id="{F4E22D25-1E8B-4B3B-94EE-4F7A9E4C6232}"/>
-              </a:ext>
-            </a:extLst>
-          </p:cNvPr>
-          <p:cNvSpPr txBox="1"/>
-          <p:nvPr/>
-        </p:nvSpPr>
-        <p:spPr>
-          <a:xfrm>
-            <a:off x="7332955" y="1149743"/>
-            <a:ext cx="4468467" cy="646331"/>
-          </a:xfrm>
-          <a:prstGeom prst="rect">
-            <a:avLst/>
-          </a:prstGeom>
-          <a:noFill/>
-        </p:spPr>
-        <p:txBody>
-          <a:bodyPr wrap="square" rtlCol="0">
-            <a:spAutoFit/>
-          </a:bodyPr>
-          <a:lstStyle/>
-          <a:p>
-            <a:r>
-              <a:rPr lang="en-US" dirty="0"/>
-              <a:t>Desktop or enterprise applications developer;</a:t>
-            </a:r>
-          </a:p>
-          <a:p>
-            <a:r>
-              <a:rPr lang="en-US" dirty="0"/>
-              <a:t>Back End</a:t>
+              <a:t>No</a:t>
             </a:r>
           </a:p>
         </p:txBody>

</xml_diff>